<commit_message>
fixed issue with scope document requirement
</commit_message>
<xml_diff>
--- a/lectures/Use cases and User stories.pptx
+++ b/lectures/Use cases and User stories.pptx
@@ -137,7 +137,6 @@
 <p1510:revInfo xmlns:a="http://schemas.openxmlformats.org/drawingml/2006/main" xmlns:r="http://schemas.openxmlformats.org/officeDocument/2006/relationships" xmlns:p1510="http://schemas.microsoft.com/office/powerpoint/2015/10/main">
   <p1510:revLst>
     <p1510:client id="{2D91E2C2-7F4C-F144-BA6C-B0D4A623CA1E}" v="23" dt="2018-11-07T17:29:41.330"/>
-    <p1510:client id="{61B7DF89-B7D7-7C40-86B0-507E1FD95028}" v="22" dt="2018-11-08T01:48:06.542"/>
   </p1510:revLst>
 </p1510:revInfo>
 </file>
@@ -147,7 +146,7 @@
   <pc:docChgLst>
     <pc:chgData name="Michaeljon Miller" userId="c575fe5cddd8b8cf" providerId="LiveId" clId="{2D91E2C2-7F4C-F144-BA6C-B0D4A623CA1E}"/>
     <pc:docChg chg="undo custSel addSld delSld modSld">
-      <pc:chgData name="Michaeljon Miller" userId="c575fe5cddd8b8cf" providerId="LiveId" clId="{2D91E2C2-7F4C-F144-BA6C-B0D4A623CA1E}" dt="2018-11-07T17:29:41.329" v="184" actId="404"/>
+      <pc:chgData name="Michaeljon Miller" userId="c575fe5cddd8b8cf" providerId="LiveId" clId="{2D91E2C2-7F4C-F144-BA6C-B0D4A623CA1E}" dt="2018-11-14T01:10:19.359" v="185" actId="400"/>
       <pc:docMkLst>
         <pc:docMk/>
       </pc:docMkLst>
@@ -195,13 +194,13 @@
         </pc:spChg>
       </pc:sldChg>
       <pc:sldChg chg="modSp">
-        <pc:chgData name="Michaeljon Miller" userId="c575fe5cddd8b8cf" providerId="LiveId" clId="{2D91E2C2-7F4C-F144-BA6C-B0D4A623CA1E}" dt="2018-11-07T17:26:42.481" v="141" actId="404"/>
+        <pc:chgData name="Michaeljon Miller" userId="c575fe5cddd8b8cf" providerId="LiveId" clId="{2D91E2C2-7F4C-F144-BA6C-B0D4A623CA1E}" dt="2018-11-14T01:10:19.359" v="185" actId="400"/>
         <pc:sldMkLst>
           <pc:docMk/>
           <pc:sldMk cId="1014490793" sldId="275"/>
         </pc:sldMkLst>
         <pc:spChg chg="mod">
-          <ac:chgData name="Michaeljon Miller" userId="c575fe5cddd8b8cf" providerId="LiveId" clId="{2D91E2C2-7F4C-F144-BA6C-B0D4A623CA1E}" dt="2018-11-07T17:26:42.481" v="141" actId="404"/>
+          <ac:chgData name="Michaeljon Miller" userId="c575fe5cddd8b8cf" providerId="LiveId" clId="{2D91E2C2-7F4C-F144-BA6C-B0D4A623CA1E}" dt="2018-11-14T01:10:19.359" v="185" actId="400"/>
           <ac:spMkLst>
             <pc:docMk/>
             <pc:sldMk cId="1014490793" sldId="275"/>
@@ -695,7 +694,7 @@
           <a:p>
             <a:fld id="{339F7D39-C0A6-FE4D-ACB4-D996C221FDD6}" type="datetimeFigureOut">
               <a:rPr lang="en-US" smtClean="0"/>
-              <a:t>11/7/18</a:t>
+              <a:t>11/13/18</a:t>
             </a:fld>
             <a:endParaRPr lang="en-US"/>
           </a:p>
@@ -1352,7 +1351,7 @@
           <a:p>
             <a:fld id="{F3487D90-B7F6-BF4B-819F-FA7E350C977E}" type="datetimeFigureOut">
               <a:rPr lang="en-US" smtClean="0"/>
-              <a:t>11/7/18</a:t>
+              <a:t>11/13/18</a:t>
             </a:fld>
             <a:endParaRPr lang="en-US"/>
           </a:p>
@@ -1520,7 +1519,7 @@
           <a:p>
             <a:fld id="{F3487D90-B7F6-BF4B-819F-FA7E350C977E}" type="datetimeFigureOut">
               <a:rPr lang="en-US" smtClean="0"/>
-              <a:t>11/7/18</a:t>
+              <a:t>11/13/18</a:t>
             </a:fld>
             <a:endParaRPr lang="en-US"/>
           </a:p>
@@ -1698,7 +1697,7 @@
           <a:p>
             <a:fld id="{F3487D90-B7F6-BF4B-819F-FA7E350C977E}" type="datetimeFigureOut">
               <a:rPr lang="en-US" smtClean="0"/>
-              <a:t>11/7/18</a:t>
+              <a:t>11/13/18</a:t>
             </a:fld>
             <a:endParaRPr lang="en-US"/>
           </a:p>
@@ -1866,7 +1865,7 @@
           <a:p>
             <a:fld id="{F3487D90-B7F6-BF4B-819F-FA7E350C977E}" type="datetimeFigureOut">
               <a:rPr lang="en-US" smtClean="0"/>
-              <a:t>11/7/18</a:t>
+              <a:t>11/13/18</a:t>
             </a:fld>
             <a:endParaRPr lang="en-US"/>
           </a:p>
@@ -2111,7 +2110,7 @@
           <a:p>
             <a:fld id="{F3487D90-B7F6-BF4B-819F-FA7E350C977E}" type="datetimeFigureOut">
               <a:rPr lang="en-US" smtClean="0"/>
-              <a:t>11/7/18</a:t>
+              <a:t>11/13/18</a:t>
             </a:fld>
             <a:endParaRPr lang="en-US"/>
           </a:p>
@@ -2340,7 +2339,7 @@
           <a:p>
             <a:fld id="{F3487D90-B7F6-BF4B-819F-FA7E350C977E}" type="datetimeFigureOut">
               <a:rPr lang="en-US" smtClean="0"/>
-              <a:t>11/7/18</a:t>
+              <a:t>11/13/18</a:t>
             </a:fld>
             <a:endParaRPr lang="en-US"/>
           </a:p>
@@ -2704,7 +2703,7 @@
           <a:p>
             <a:fld id="{F3487D90-B7F6-BF4B-819F-FA7E350C977E}" type="datetimeFigureOut">
               <a:rPr lang="en-US" smtClean="0"/>
-              <a:t>11/7/18</a:t>
+              <a:t>11/13/18</a:t>
             </a:fld>
             <a:endParaRPr lang="en-US"/>
           </a:p>
@@ -2821,7 +2820,7 @@
           <a:p>
             <a:fld id="{F3487D90-B7F6-BF4B-819F-FA7E350C977E}" type="datetimeFigureOut">
               <a:rPr lang="en-US" smtClean="0"/>
-              <a:t>11/7/18</a:t>
+              <a:t>11/13/18</a:t>
             </a:fld>
             <a:endParaRPr lang="en-US"/>
           </a:p>
@@ -2916,7 +2915,7 @@
           <a:p>
             <a:fld id="{F3487D90-B7F6-BF4B-819F-FA7E350C977E}" type="datetimeFigureOut">
               <a:rPr lang="en-US" smtClean="0"/>
-              <a:t>11/7/18</a:t>
+              <a:t>11/13/18</a:t>
             </a:fld>
             <a:endParaRPr lang="en-US"/>
           </a:p>
@@ -3191,7 +3190,7 @@
           <a:p>
             <a:fld id="{F3487D90-B7F6-BF4B-819F-FA7E350C977E}" type="datetimeFigureOut">
               <a:rPr lang="en-US" smtClean="0"/>
-              <a:t>11/7/18</a:t>
+              <a:t>11/13/18</a:t>
             </a:fld>
             <a:endParaRPr lang="en-US"/>
           </a:p>
@@ -3443,7 +3442,7 @@
           <a:p>
             <a:fld id="{F3487D90-B7F6-BF4B-819F-FA7E350C977E}" type="datetimeFigureOut">
               <a:rPr lang="en-US" smtClean="0"/>
-              <a:t>11/7/18</a:t>
+              <a:t>11/13/18</a:t>
             </a:fld>
             <a:endParaRPr lang="en-US"/>
           </a:p>
@@ -3654,7 +3653,7 @@
           <a:p>
             <a:fld id="{F3487D90-B7F6-BF4B-819F-FA7E350C977E}" type="datetimeFigureOut">
               <a:rPr lang="en-US" smtClean="0"/>
-              <a:t>11/7/18</a:t>
+              <a:t>11/13/18</a:t>
             </a:fld>
             <a:endParaRPr lang="en-US"/>
           </a:p>
@@ -5671,7 +5670,7 @@
               <a:buNone/>
             </a:pPr>
             <a:r>
-              <a:rPr lang="en-US"/>
+              <a:rPr lang="en-US" dirty="0"/>
               <a:t>No class on Monday because it’s a holiday</a:t>
             </a:r>
           </a:p>
@@ -5679,14 +5678,14 @@
             <a:pPr marL="0" indent="0">
               <a:buNone/>
             </a:pPr>
-            <a:endParaRPr lang="en-US"/>
+            <a:endParaRPr lang="en-US" dirty="0"/>
           </a:p>
           <a:p>
             <a:pPr marL="0" indent="0">
               <a:buNone/>
             </a:pPr>
             <a:r>
-              <a:rPr lang="en-US"/>
+              <a:rPr lang="en-US" dirty="0"/>
               <a:t>Vision statement for a system you have or are working on</a:t>
             </a:r>
           </a:p>
@@ -5695,7 +5694,7 @@
               <a:buNone/>
             </a:pPr>
             <a:r>
-              <a:rPr lang="en-US"/>
+              <a:rPr lang="en-US" strike="sngStrike" dirty="0"/>
               <a:t>Draft scope document for above</a:t>
             </a:r>
           </a:p>
@@ -5703,55 +5702,55 @@
             <a:pPr marL="0" indent="0">
               <a:buNone/>
             </a:pPr>
-            <a:endParaRPr lang="en-US"/>
+            <a:endParaRPr lang="en-US" dirty="0"/>
           </a:p>
           <a:p>
             <a:pPr marL="0" indent="0">
               <a:buNone/>
             </a:pPr>
             <a:r>
-              <a:rPr lang="en-US" sz="2600">
+              <a:rPr lang="en-US" sz="2600" dirty="0">
                 <a:hlinkClick r:id="rId2"/>
               </a:rPr>
               <a:t>http://leanmagazine.net/req/a-use-case-is-to-a-user-story-as-a-gazelle-to-a-gazebo/</a:t>
             </a:r>
-            <a:endParaRPr lang="en-US" sz="2600"/>
+            <a:endParaRPr lang="en-US" sz="2600" dirty="0"/>
           </a:p>
           <a:p>
             <a:pPr marL="0" indent="0">
               <a:buNone/>
             </a:pPr>
             <a:r>
-              <a:rPr lang="en-US" sz="2600">
+              <a:rPr lang="en-US" sz="2600" dirty="0">
                 <a:hlinkClick r:id="rId3"/>
               </a:rPr>
               <a:t>http://www.mountaingoatsoftware.com/articles/advantages-of-user-stories-for-requirements</a:t>
             </a:r>
-            <a:endParaRPr lang="en-US" sz="2600"/>
+            <a:endParaRPr lang="en-US" sz="2600" dirty="0"/>
           </a:p>
           <a:p>
             <a:pPr marL="0" indent="0">
               <a:buNone/>
             </a:pPr>
             <a:r>
-              <a:rPr lang="en-US" sz="2600">
+              <a:rPr lang="en-US" sz="2600" dirty="0">
                 <a:hlinkClick r:id="rId4"/>
               </a:rPr>
               <a:t>http://wiki.c2.com/?UserStoryAndUseCaseComparison</a:t>
             </a:r>
-            <a:endParaRPr lang="en-US" sz="2600"/>
+            <a:endParaRPr lang="en-US" sz="2600" dirty="0"/>
           </a:p>
           <a:p>
             <a:pPr marL="0" indent="0">
               <a:buNone/>
             </a:pPr>
-            <a:endParaRPr lang="en-US"/>
+            <a:endParaRPr lang="en-US" dirty="0"/>
           </a:p>
           <a:p>
             <a:pPr marL="0" indent="0">
               <a:buNone/>
             </a:pPr>
-            <a:endParaRPr lang="en-US"/>
+            <a:endParaRPr lang="en-US" dirty="0"/>
           </a:p>
         </p:txBody>
       </p:sp>

</xml_diff>